<commit_message>
Atualizada Aula 7 com tabela
</commit_message>
<xml_diff>
--- a/UC1 - Matemática Aplicada/Slides/Aula 7/Aula 7 - Lógica Proposicional - Equivalências .pptx
+++ b/UC1 - Matemática Aplicada/Slides/Aula 7/Aula 7 - Lógica Proposicional - Equivalências .pptx
@@ -5,10 +5,10 @@
     <p:sldMasterId id="2147483671" r:id="rId1"/>
   </p:sldMasterIdLst>
   <p:notesMasterIdLst>
-    <p:notesMasterId r:id="rId32"/>
+    <p:notesMasterId r:id="rId33"/>
   </p:notesMasterIdLst>
   <p:handoutMasterIdLst>
-    <p:handoutMasterId r:id="rId33"/>
+    <p:handoutMasterId r:id="rId34"/>
   </p:handoutMasterIdLst>
   <p:sldIdLst>
     <p:sldId id="286" r:id="rId2"/>
@@ -38,31 +38,32 @@
     <p:sldId id="349" r:id="rId26"/>
     <p:sldId id="350" r:id="rId27"/>
     <p:sldId id="351" r:id="rId28"/>
-    <p:sldId id="299" r:id="rId29"/>
-    <p:sldId id="309" r:id="rId30"/>
-    <p:sldId id="355" r:id="rId31"/>
+    <p:sldId id="356" r:id="rId29"/>
+    <p:sldId id="299" r:id="rId30"/>
+    <p:sldId id="309" r:id="rId31"/>
+    <p:sldId id="355" r:id="rId32"/>
   </p:sldIdLst>
   <p:sldSz cx="9144000" cy="5143500" type="screen16x9"/>
   <p:notesSz cx="6858000" cy="9144000"/>
   <p:embeddedFontLst>
     <p:embeddedFont>
       <p:font typeface="Cambria" panose="02040503050406030204" pitchFamily="18" charset="0"/>
-      <p:regular r:id="rId34"/>
-      <p:bold r:id="rId35"/>
-      <p:italic r:id="rId36"/>
-      <p:boldItalic r:id="rId37"/>
+      <p:regular r:id="rId35"/>
+      <p:bold r:id="rId36"/>
+      <p:italic r:id="rId37"/>
+      <p:boldItalic r:id="rId38"/>
     </p:embeddedFont>
     <p:embeddedFont>
       <p:font typeface="Montserrat ExtraBold" panose="00000900000000000000" pitchFamily="2" charset="0"/>
-      <p:bold r:id="rId38"/>
-      <p:boldItalic r:id="rId39"/>
+      <p:bold r:id="rId39"/>
+      <p:boldItalic r:id="rId40"/>
     </p:embeddedFont>
     <p:embeddedFont>
       <p:font typeface="Spectral Light" panose="020B0604020202020204" charset="0"/>
-      <p:regular r:id="rId40"/>
-      <p:bold r:id="rId41"/>
-      <p:italic r:id="rId42"/>
-      <p:boldItalic r:id="rId43"/>
+      <p:regular r:id="rId41"/>
+      <p:bold r:id="rId42"/>
+      <p:italic r:id="rId43"/>
+      <p:boldItalic r:id="rId44"/>
     </p:embeddedFont>
   </p:embeddedFontLst>
   <p:defaultTextStyle>
@@ -460,7 +461,7 @@
           <a:p>
             <a:fld id="{B8DAE9AD-0277-1C48-A4A6-9639BCA59213}" type="datetimeFigureOut">
               <a:rPr lang="pt-BR" smtClean="0"/>
-              <a:t>27/10/2022</a:t>
+              <a:t>31/10/2022</a:t>
             </a:fld>
             <a:endParaRPr lang="pt-BR"/>
           </a:p>
@@ -3176,6 +3177,115 @@
   <p:cSld>
     <p:spTree>
       <p:nvGrpSpPr>
+        <p:cNvPr id="1" name="Shape 197"/>
+        <p:cNvGrpSpPr/>
+        <p:nvPr/>
+      </p:nvGrpSpPr>
+      <p:grpSpPr>
+        <a:xfrm>
+          <a:off x="0" y="0"/>
+          <a:ext cx="0" cy="0"/>
+          <a:chOff x="0" y="0"/>
+          <a:chExt cx="0" cy="0"/>
+        </a:xfrm>
+      </p:grpSpPr>
+      <p:sp>
+        <p:nvSpPr>
+          <p:cNvPr id="198" name="Google Shape;198;g3de7457949_0_269:notes"/>
+          <p:cNvSpPr>
+            <a:spLocks noGrp="1" noRot="1" noChangeAspect="1"/>
+          </p:cNvSpPr>
+          <p:nvPr>
+            <p:ph type="sldImg" idx="2"/>
+          </p:nvPr>
+        </p:nvSpPr>
+        <p:spPr>
+          <a:xfrm>
+            <a:off x="381000" y="685800"/>
+            <a:ext cx="6096000" cy="3429000"/>
+          </a:xfrm>
+          <a:custGeom>
+            <a:avLst/>
+            <a:gdLst/>
+            <a:ahLst/>
+            <a:cxnLst/>
+            <a:rect l="l" t="t" r="r" b="b"/>
+            <a:pathLst>
+              <a:path w="120000" h="120000" extrusionOk="0">
+                <a:moveTo>
+                  <a:pt x="0" y="0"/>
+                </a:moveTo>
+                <a:lnTo>
+                  <a:pt x="120000" y="0"/>
+                </a:lnTo>
+                <a:lnTo>
+                  <a:pt x="120000" y="120000"/>
+                </a:lnTo>
+                <a:lnTo>
+                  <a:pt x="0" y="120000"/>
+                </a:lnTo>
+                <a:close/>
+              </a:path>
+            </a:pathLst>
+          </a:custGeom>
+        </p:spPr>
+      </p:sp>
+      <p:sp>
+        <p:nvSpPr>
+          <p:cNvPr id="199" name="Google Shape;199;g3de7457949_0_269:notes"/>
+          <p:cNvSpPr txBox="1">
+            <a:spLocks noGrp="1"/>
+          </p:cNvSpPr>
+          <p:nvPr>
+            <p:ph type="body" idx="1"/>
+          </p:nvPr>
+        </p:nvSpPr>
+        <p:spPr>
+          <a:xfrm>
+            <a:off x="685800" y="4343400"/>
+            <a:ext cx="5486400" cy="4114800"/>
+          </a:xfrm>
+          <a:prstGeom prst="rect">
+            <a:avLst/>
+          </a:prstGeom>
+        </p:spPr>
+        <p:txBody>
+          <a:bodyPr spcFirstLastPara="1" wrap="square" lIns="91425" tIns="91425" rIns="91425" bIns="91425" anchor="t" anchorCtr="0">
+            <a:noAutofit/>
+          </a:bodyPr>
+          <a:lstStyle/>
+          <a:p>
+            <a:pPr marL="0" lvl="0" indent="0" algn="l" rtl="0">
+              <a:spcBef>
+                <a:spcPts val="0"/>
+              </a:spcBef>
+              <a:spcAft>
+                <a:spcPts val="0"/>
+              </a:spcAft>
+              <a:buNone/>
+            </a:pPr>
+            <a:endParaRPr/>
+          </a:p>
+        </p:txBody>
+      </p:sp>
+    </p:spTree>
+    <p:extLst>
+      <p:ext uri="{BB962C8B-B14F-4D97-AF65-F5344CB8AC3E}">
+        <p14:creationId xmlns:p14="http://schemas.microsoft.com/office/powerpoint/2010/main" val="3904504410"/>
+      </p:ext>
+    </p:extLst>
+  </p:cSld>
+  <p:clrMapOvr>
+    <a:masterClrMapping/>
+  </p:clrMapOvr>
+</p:notes>
+</file>
+
+<file path=ppt/notesSlides/notesSlide29.xml><?xml version="1.0" encoding="utf-8"?>
+<p:notes xmlns:a="http://schemas.openxmlformats.org/drawingml/2006/main" xmlns:r="http://schemas.openxmlformats.org/officeDocument/2006/relationships" xmlns:p="http://schemas.openxmlformats.org/presentationml/2006/main" showMasterSp="0" showMasterPhAnim="0">
+  <p:cSld>
+    <p:spTree>
+      <p:nvGrpSpPr>
         <p:cNvPr id="1" name="Shape 639"/>
         <p:cNvGrpSpPr/>
         <p:nvPr/>
@@ -3268,115 +3378,6 @@
         </p:txBody>
       </p:sp>
     </p:spTree>
-  </p:cSld>
-  <p:clrMapOvr>
-    <a:masterClrMapping/>
-  </p:clrMapOvr>
-</p:notes>
-</file>
-
-<file path=ppt/notesSlides/notesSlide29.xml><?xml version="1.0" encoding="utf-8"?>
-<p:notes xmlns:a="http://schemas.openxmlformats.org/drawingml/2006/main" xmlns:r="http://schemas.openxmlformats.org/officeDocument/2006/relationships" xmlns:p="http://schemas.openxmlformats.org/presentationml/2006/main" showMasterSp="0" showMasterPhAnim="0">
-  <p:cSld>
-    <p:spTree>
-      <p:nvGrpSpPr>
-        <p:cNvPr id="1" name="Shape 197"/>
-        <p:cNvGrpSpPr/>
-        <p:nvPr/>
-      </p:nvGrpSpPr>
-      <p:grpSpPr>
-        <a:xfrm>
-          <a:off x="0" y="0"/>
-          <a:ext cx="0" cy="0"/>
-          <a:chOff x="0" y="0"/>
-          <a:chExt cx="0" cy="0"/>
-        </a:xfrm>
-      </p:grpSpPr>
-      <p:sp>
-        <p:nvSpPr>
-          <p:cNvPr id="198" name="Google Shape;198;g3de7457949_0_269:notes"/>
-          <p:cNvSpPr>
-            <a:spLocks noGrp="1" noRot="1" noChangeAspect="1"/>
-          </p:cNvSpPr>
-          <p:nvPr>
-            <p:ph type="sldImg" idx="2"/>
-          </p:nvPr>
-        </p:nvSpPr>
-        <p:spPr>
-          <a:xfrm>
-            <a:off x="381000" y="685800"/>
-            <a:ext cx="6096000" cy="3429000"/>
-          </a:xfrm>
-          <a:custGeom>
-            <a:avLst/>
-            <a:gdLst/>
-            <a:ahLst/>
-            <a:cxnLst/>
-            <a:rect l="l" t="t" r="r" b="b"/>
-            <a:pathLst>
-              <a:path w="120000" h="120000" extrusionOk="0">
-                <a:moveTo>
-                  <a:pt x="0" y="0"/>
-                </a:moveTo>
-                <a:lnTo>
-                  <a:pt x="120000" y="0"/>
-                </a:lnTo>
-                <a:lnTo>
-                  <a:pt x="120000" y="120000"/>
-                </a:lnTo>
-                <a:lnTo>
-                  <a:pt x="0" y="120000"/>
-                </a:lnTo>
-                <a:close/>
-              </a:path>
-            </a:pathLst>
-          </a:custGeom>
-        </p:spPr>
-      </p:sp>
-      <p:sp>
-        <p:nvSpPr>
-          <p:cNvPr id="199" name="Google Shape;199;g3de7457949_0_269:notes"/>
-          <p:cNvSpPr txBox="1">
-            <a:spLocks noGrp="1"/>
-          </p:cNvSpPr>
-          <p:nvPr>
-            <p:ph type="body" idx="1"/>
-          </p:nvPr>
-        </p:nvSpPr>
-        <p:spPr>
-          <a:xfrm>
-            <a:off x="685800" y="4343400"/>
-            <a:ext cx="5486400" cy="4114800"/>
-          </a:xfrm>
-          <a:prstGeom prst="rect">
-            <a:avLst/>
-          </a:prstGeom>
-        </p:spPr>
-        <p:txBody>
-          <a:bodyPr spcFirstLastPara="1" wrap="square" lIns="91425" tIns="91425" rIns="91425" bIns="91425" anchor="t" anchorCtr="0">
-            <a:noAutofit/>
-          </a:bodyPr>
-          <a:lstStyle/>
-          <a:p>
-            <a:pPr marL="0" lvl="0" indent="0" algn="l" rtl="0">
-              <a:spcBef>
-                <a:spcPts val="0"/>
-              </a:spcBef>
-              <a:spcAft>
-                <a:spcPts val="0"/>
-              </a:spcAft>
-              <a:buNone/>
-            </a:pPr>
-            <a:endParaRPr/>
-          </a:p>
-        </p:txBody>
-      </p:sp>
-    </p:spTree>
-    <p:extLst>
-      <p:ext uri="{BB962C8B-B14F-4D97-AF65-F5344CB8AC3E}">
-        <p14:creationId xmlns:p14="http://schemas.microsoft.com/office/powerpoint/2010/main" val="3666957949"/>
-      </p:ext>
-    </p:extLst>
   </p:cSld>
   <p:clrMapOvr>
     <a:masterClrMapping/>
@@ -3494,6 +3495,115 @@
 </file>
 
 <file path=ppt/notesSlides/notesSlide30.xml><?xml version="1.0" encoding="utf-8"?>
+<p:notes xmlns:a="http://schemas.openxmlformats.org/drawingml/2006/main" xmlns:r="http://schemas.openxmlformats.org/officeDocument/2006/relationships" xmlns:p="http://schemas.openxmlformats.org/presentationml/2006/main" showMasterSp="0" showMasterPhAnim="0">
+  <p:cSld>
+    <p:spTree>
+      <p:nvGrpSpPr>
+        <p:cNvPr id="1" name="Shape 197"/>
+        <p:cNvGrpSpPr/>
+        <p:nvPr/>
+      </p:nvGrpSpPr>
+      <p:grpSpPr>
+        <a:xfrm>
+          <a:off x="0" y="0"/>
+          <a:ext cx="0" cy="0"/>
+          <a:chOff x="0" y="0"/>
+          <a:chExt cx="0" cy="0"/>
+        </a:xfrm>
+      </p:grpSpPr>
+      <p:sp>
+        <p:nvSpPr>
+          <p:cNvPr id="198" name="Google Shape;198;g3de7457949_0_269:notes"/>
+          <p:cNvSpPr>
+            <a:spLocks noGrp="1" noRot="1" noChangeAspect="1"/>
+          </p:cNvSpPr>
+          <p:nvPr>
+            <p:ph type="sldImg" idx="2"/>
+          </p:nvPr>
+        </p:nvSpPr>
+        <p:spPr>
+          <a:xfrm>
+            <a:off x="381000" y="685800"/>
+            <a:ext cx="6096000" cy="3429000"/>
+          </a:xfrm>
+          <a:custGeom>
+            <a:avLst/>
+            <a:gdLst/>
+            <a:ahLst/>
+            <a:cxnLst/>
+            <a:rect l="l" t="t" r="r" b="b"/>
+            <a:pathLst>
+              <a:path w="120000" h="120000" extrusionOk="0">
+                <a:moveTo>
+                  <a:pt x="0" y="0"/>
+                </a:moveTo>
+                <a:lnTo>
+                  <a:pt x="120000" y="0"/>
+                </a:lnTo>
+                <a:lnTo>
+                  <a:pt x="120000" y="120000"/>
+                </a:lnTo>
+                <a:lnTo>
+                  <a:pt x="0" y="120000"/>
+                </a:lnTo>
+                <a:close/>
+              </a:path>
+            </a:pathLst>
+          </a:custGeom>
+        </p:spPr>
+      </p:sp>
+      <p:sp>
+        <p:nvSpPr>
+          <p:cNvPr id="199" name="Google Shape;199;g3de7457949_0_269:notes"/>
+          <p:cNvSpPr txBox="1">
+            <a:spLocks noGrp="1"/>
+          </p:cNvSpPr>
+          <p:nvPr>
+            <p:ph type="body" idx="1"/>
+          </p:nvPr>
+        </p:nvSpPr>
+        <p:spPr>
+          <a:xfrm>
+            <a:off x="685800" y="4343400"/>
+            <a:ext cx="5486400" cy="4114800"/>
+          </a:xfrm>
+          <a:prstGeom prst="rect">
+            <a:avLst/>
+          </a:prstGeom>
+        </p:spPr>
+        <p:txBody>
+          <a:bodyPr spcFirstLastPara="1" wrap="square" lIns="91425" tIns="91425" rIns="91425" bIns="91425" anchor="t" anchorCtr="0">
+            <a:noAutofit/>
+          </a:bodyPr>
+          <a:lstStyle/>
+          <a:p>
+            <a:pPr marL="0" lvl="0" indent="0" algn="l" rtl="0">
+              <a:spcBef>
+                <a:spcPts val="0"/>
+              </a:spcBef>
+              <a:spcAft>
+                <a:spcPts val="0"/>
+              </a:spcAft>
+              <a:buNone/>
+            </a:pPr>
+            <a:endParaRPr/>
+          </a:p>
+        </p:txBody>
+      </p:sp>
+    </p:spTree>
+    <p:extLst>
+      <p:ext uri="{BB962C8B-B14F-4D97-AF65-F5344CB8AC3E}">
+        <p14:creationId xmlns:p14="http://schemas.microsoft.com/office/powerpoint/2010/main" val="3666957949"/>
+      </p:ext>
+    </p:extLst>
+  </p:cSld>
+  <p:clrMapOvr>
+    <a:masterClrMapping/>
+  </p:clrMapOvr>
+</p:notes>
+</file>
+
+<file path=ppt/notesSlides/notesSlide31.xml><?xml version="1.0" encoding="utf-8"?>
 <p:notes xmlns:a="http://schemas.openxmlformats.org/drawingml/2006/main" xmlns:r="http://schemas.openxmlformats.org/officeDocument/2006/relationships" xmlns:p="http://schemas.openxmlformats.org/presentationml/2006/main" showMasterSp="0" showMasterPhAnim="0">
   <p:cSld>
     <p:spTree>
@@ -12820,6 +12930,143 @@
   <p:cSld>
     <p:spTree>
       <p:nvGrpSpPr>
+        <p:cNvPr id="1" name="Shape 200"/>
+        <p:cNvGrpSpPr/>
+        <p:nvPr/>
+      </p:nvGrpSpPr>
+      <p:grpSpPr>
+        <a:xfrm>
+          <a:off x="0" y="0"/>
+          <a:ext cx="0" cy="0"/>
+          <a:chOff x="0" y="0"/>
+          <a:chExt cx="0" cy="0"/>
+        </a:xfrm>
+      </p:grpSpPr>
+      <p:sp>
+        <p:nvSpPr>
+          <p:cNvPr id="4" name="Retângulo 5">
+            <a:extLst>
+              <a:ext uri="{FF2B5EF4-FFF2-40B4-BE49-F238E27FC236}">
+                <a16:creationId xmlns:a16="http://schemas.microsoft.com/office/drawing/2014/main" id="{2BB587C4-D016-F3B7-C920-AB2EE96D3BC4}"/>
+              </a:ext>
+            </a:extLst>
+          </p:cNvPr>
+          <p:cNvSpPr>
+            <a:spLocks noChangeArrowheads="1"/>
+          </p:cNvSpPr>
+          <p:nvPr/>
+        </p:nvSpPr>
+        <p:spPr bwMode="auto">
+          <a:xfrm>
+            <a:off x="1362901" y="1254450"/>
+            <a:ext cx="7427935" cy="707886"/>
+          </a:xfrm>
+          <a:prstGeom prst="rect">
+            <a:avLst/>
+          </a:prstGeom>
+          <a:noFill/>
+          <a:ln w="9525">
+            <a:noFill/>
+            <a:miter lim="800000"/>
+            <a:headEnd/>
+            <a:tailEnd/>
+          </a:ln>
+        </p:spPr>
+        <p:txBody>
+          <a:bodyPr wrap="square">
+            <a:spAutoFit/>
+          </a:bodyPr>
+          <a:lstStyle/>
+          <a:p>
+            <a:pPr marL="342900" indent="-342900">
+              <a:buClr>
+                <a:srgbClr val="33CC33"/>
+              </a:buClr>
+              <a:defRPr/>
+            </a:pPr>
+            <a:endParaRPr lang="pt-BR" sz="2000" i="1" dirty="0">
+              <a:latin typeface="Times New Roman" panose="02020603050405020304" pitchFamily="18" charset="0"/>
+              <a:cs typeface="Times New Roman" panose="02020603050405020304" pitchFamily="18" charset="0"/>
+            </a:endParaRPr>
+          </a:p>
+          <a:p>
+            <a:pPr marL="342900" indent="-342900">
+              <a:buFont typeface="Wingdings" pitchFamily="2" charset="2"/>
+              <a:buChar char="v"/>
+              <a:defRPr/>
+            </a:pPr>
+            <a:endParaRPr lang="pt-BR" sz="2000" b="1" dirty="0">
+              <a:latin typeface="Times New Roman" panose="02020603050405020304" pitchFamily="18" charset="0"/>
+              <a:cs typeface="Times New Roman" panose="02020603050405020304" pitchFamily="18" charset="0"/>
+            </a:endParaRPr>
+          </a:p>
+        </p:txBody>
+      </p:sp>
+      <p:pic>
+        <p:nvPicPr>
+          <p:cNvPr id="1026" name="Picture 2">
+            <a:extLst>
+              <a:ext uri="{FF2B5EF4-FFF2-40B4-BE49-F238E27FC236}">
+                <a16:creationId xmlns:a16="http://schemas.microsoft.com/office/drawing/2014/main" id="{BE6085BD-C860-E912-7721-F0F82A328902}"/>
+              </a:ext>
+            </a:extLst>
+          </p:cNvPr>
+          <p:cNvPicPr>
+            <a:picLocks noChangeAspect="1" noChangeArrowheads="1"/>
+          </p:cNvPicPr>
+          <p:nvPr/>
+        </p:nvPicPr>
+        <p:blipFill>
+          <a:blip r:embed="rId3">
+            <a:extLst>
+              <a:ext uri="{28A0092B-C50C-407E-A947-70E740481C1C}">
+                <a14:useLocalDpi xmlns:a14="http://schemas.microsoft.com/office/drawing/2010/main" val="0"/>
+              </a:ext>
+            </a:extLst>
+          </a:blip>
+          <a:srcRect/>
+          <a:stretch>
+            <a:fillRect/>
+          </a:stretch>
+        </p:blipFill>
+        <p:spPr bwMode="auto">
+          <a:xfrm>
+            <a:off x="2872624" y="0"/>
+            <a:ext cx="4408487" cy="5143500"/>
+          </a:xfrm>
+          <a:prstGeom prst="rect">
+            <a:avLst/>
+          </a:prstGeom>
+          <a:noFill/>
+          <a:extLst>
+            <a:ext uri="{909E8E84-426E-40DD-AFC4-6F175D3DCCD1}">
+              <a14:hiddenFill xmlns:a14="http://schemas.microsoft.com/office/drawing/2010/main">
+                <a:solidFill>
+                  <a:srgbClr val="FFFFFF"/>
+                </a:solidFill>
+              </a14:hiddenFill>
+            </a:ext>
+          </a:extLst>
+        </p:spPr>
+      </p:pic>
+    </p:spTree>
+    <p:extLst>
+      <p:ext uri="{BB962C8B-B14F-4D97-AF65-F5344CB8AC3E}">
+        <p14:creationId xmlns:p14="http://schemas.microsoft.com/office/powerpoint/2010/main" val="996310912"/>
+      </p:ext>
+    </p:extLst>
+  </p:cSld>
+  <p:clrMapOvr>
+    <a:masterClrMapping/>
+  </p:clrMapOvr>
+</p:sld>
+</file>
+
+<file path=ppt/slides/slide29.xml><?xml version="1.0" encoding="utf-8"?>
+<p:sld xmlns:a="http://schemas.openxmlformats.org/drawingml/2006/main" xmlns:r="http://schemas.openxmlformats.org/officeDocument/2006/relationships" xmlns:p="http://schemas.openxmlformats.org/presentationml/2006/main">
+  <p:cSld>
+    <p:spTree>
+      <p:nvGrpSpPr>
         <p:cNvPr id="1" name="Shape 642"/>
         <p:cNvGrpSpPr/>
         <p:nvPr/>
@@ -12932,357 +13179,6 @@
         </p:spPr>
       </p:pic>
     </p:spTree>
-  </p:cSld>
-  <p:clrMapOvr>
-    <a:masterClrMapping/>
-  </p:clrMapOvr>
-</p:sld>
-</file>
-
-<file path=ppt/slides/slide29.xml><?xml version="1.0" encoding="utf-8"?>
-<p:sld xmlns:a="http://schemas.openxmlformats.org/drawingml/2006/main" xmlns:r="http://schemas.openxmlformats.org/officeDocument/2006/relationships" xmlns:p="http://schemas.openxmlformats.org/presentationml/2006/main">
-  <p:cSld>
-    <p:spTree>
-      <p:nvGrpSpPr>
-        <p:cNvPr id="1" name="Shape 200"/>
-        <p:cNvGrpSpPr/>
-        <p:nvPr/>
-      </p:nvGrpSpPr>
-      <p:grpSpPr>
-        <a:xfrm>
-          <a:off x="0" y="0"/>
-          <a:ext cx="0" cy="0"/>
-          <a:chOff x="0" y="0"/>
-          <a:chExt cx="0" cy="0"/>
-        </a:xfrm>
-      </p:grpSpPr>
-      <p:sp>
-        <p:nvSpPr>
-          <p:cNvPr id="6" name="Google Shape;85;p5">
-            <a:extLst>
-              <a:ext uri="{FF2B5EF4-FFF2-40B4-BE49-F238E27FC236}">
-                <a16:creationId xmlns:a16="http://schemas.microsoft.com/office/drawing/2014/main" id="{5804EB6E-36FD-2DBF-5A57-FFB57FEF4D3F}"/>
-              </a:ext>
-            </a:extLst>
-          </p:cNvPr>
-          <p:cNvSpPr txBox="1"/>
-          <p:nvPr/>
-        </p:nvSpPr>
-        <p:spPr>
-          <a:xfrm>
-            <a:off x="1396272" y="486231"/>
-            <a:ext cx="7942263" cy="461665"/>
-          </a:xfrm>
-          <a:prstGeom prst="rect">
-            <a:avLst/>
-          </a:prstGeom>
-          <a:noFill/>
-          <a:ln>
-            <a:noFill/>
-          </a:ln>
-        </p:spPr>
-        <p:txBody>
-          <a:bodyPr spcFirstLastPara="1" wrap="square" lIns="91425" tIns="45700" rIns="91425" bIns="45700" anchor="t" anchorCtr="0">
-            <a:spAutoFit/>
-          </a:bodyPr>
-          <a:lstStyle/>
-          <a:p>
-            <a:pPr marL="0" marR="0" lvl="0" indent="0" algn="l" rtl="0">
-              <a:spcBef>
-                <a:spcPts val="0"/>
-              </a:spcBef>
-              <a:spcAft>
-                <a:spcPts val="0"/>
-              </a:spcAft>
-              <a:buClr>
-                <a:srgbClr val="000000"/>
-              </a:buClr>
-              <a:buSzPts val="2400"/>
-              <a:buFont typeface="Times New Roman"/>
-              <a:buNone/>
-            </a:pPr>
-            <a:r>
-              <a:rPr lang="pt-BR" sz="2400" b="1" i="0" u="none" strike="noStrike" cap="none" dirty="0">
-                <a:solidFill>
-                  <a:schemeClr val="dk1"/>
-                </a:solidFill>
-                <a:latin typeface="Times New Roman"/>
-                <a:ea typeface="Times New Roman"/>
-                <a:cs typeface="Times New Roman"/>
-                <a:sym typeface="Times New Roman"/>
-              </a:rPr>
-              <a:t>Referências</a:t>
-            </a:r>
-            <a:endParaRPr lang="pt-BR" sz="2400" b="0" i="0" u="none" strike="noStrike" cap="none" dirty="0">
-              <a:solidFill>
-                <a:schemeClr val="dk1"/>
-              </a:solidFill>
-              <a:latin typeface="Times New Roman"/>
-              <a:ea typeface="Times New Roman"/>
-              <a:cs typeface="Times New Roman"/>
-              <a:sym typeface="Times New Roman"/>
-            </a:endParaRPr>
-          </a:p>
-        </p:txBody>
-      </p:sp>
-      <p:sp>
-        <p:nvSpPr>
-          <p:cNvPr id="7" name="Google Shape;86;p5">
-            <a:extLst>
-              <a:ext uri="{FF2B5EF4-FFF2-40B4-BE49-F238E27FC236}">
-                <a16:creationId xmlns:a16="http://schemas.microsoft.com/office/drawing/2014/main" id="{F71C8896-B182-51DF-7B81-F69944D4984F}"/>
-              </a:ext>
-            </a:extLst>
-          </p:cNvPr>
-          <p:cNvSpPr txBox="1"/>
-          <p:nvPr/>
-        </p:nvSpPr>
-        <p:spPr>
-          <a:xfrm>
-            <a:off x="1396272" y="1680881"/>
-            <a:ext cx="7100306" cy="3046948"/>
-          </a:xfrm>
-          <a:prstGeom prst="rect">
-            <a:avLst/>
-          </a:prstGeom>
-          <a:noFill/>
-          <a:ln>
-            <a:noFill/>
-          </a:ln>
-        </p:spPr>
-        <p:txBody>
-          <a:bodyPr spcFirstLastPara="1" wrap="square" lIns="91425" tIns="45700" rIns="91425" bIns="45700" anchor="t" anchorCtr="0">
-            <a:spAutoFit/>
-          </a:bodyPr>
-          <a:lstStyle/>
-          <a:p>
-            <a:pPr marL="0" marR="0" lvl="0" indent="0" algn="l" rtl="0">
-              <a:spcBef>
-                <a:spcPts val="0"/>
-              </a:spcBef>
-              <a:spcAft>
-                <a:spcPts val="0"/>
-              </a:spcAft>
-              <a:buClr>
-                <a:srgbClr val="000000"/>
-              </a:buClr>
-              <a:buSzPts val="1800"/>
-              <a:buFont typeface="Times New Roman"/>
-              <a:buNone/>
-            </a:pPr>
-            <a:r>
-              <a:rPr lang="pt-BR" sz="1600" b="0" i="0" u="none" strike="noStrike" cap="none" dirty="0">
-                <a:solidFill>
-                  <a:schemeClr val="dk1"/>
-                </a:solidFill>
-                <a:latin typeface="Times New Roman"/>
-                <a:ea typeface="Times New Roman"/>
-                <a:cs typeface="Times New Roman"/>
-                <a:sym typeface="Times New Roman"/>
-              </a:rPr>
-              <a:t>https://www.infoescola.com/matematica/logica-proposicional/</a:t>
-            </a:r>
-            <a:endParaRPr lang="pt-BR" sz="1600" dirty="0"/>
-          </a:p>
-          <a:p>
-            <a:pPr marL="0" marR="0" lvl="0" indent="0" algn="l" rtl="0">
-              <a:spcBef>
-                <a:spcPts val="0"/>
-              </a:spcBef>
-              <a:spcAft>
-                <a:spcPts val="0"/>
-              </a:spcAft>
-              <a:buClr>
-                <a:srgbClr val="000000"/>
-              </a:buClr>
-              <a:buSzPts val="1800"/>
-              <a:buFont typeface="Times New Roman"/>
-              <a:buNone/>
-            </a:pPr>
-            <a:r>
-              <a:rPr lang="pt-BR" sz="1600" b="0" i="0" u="none" strike="noStrike" cap="none" dirty="0">
-                <a:solidFill>
-                  <a:schemeClr val="dk1"/>
-                </a:solidFill>
-                <a:latin typeface="Times New Roman"/>
-                <a:ea typeface="Times New Roman"/>
-                <a:cs typeface="Times New Roman"/>
-                <a:sym typeface="Times New Roman"/>
-              </a:rPr>
-              <a:t>https://www.infoescola.com/matematica/conectivos-logicos/</a:t>
-            </a:r>
-            <a:endParaRPr lang="pt-BR" sz="1600" dirty="0"/>
-          </a:p>
-          <a:p>
-            <a:pPr marL="0" marR="0" lvl="0" indent="0" algn="l" rtl="0">
-              <a:spcBef>
-                <a:spcPts val="0"/>
-              </a:spcBef>
-              <a:spcAft>
-                <a:spcPts val="0"/>
-              </a:spcAft>
-              <a:buClr>
-                <a:srgbClr val="000000"/>
-              </a:buClr>
-              <a:buSzPts val="1800"/>
-              <a:buFont typeface="Times New Roman"/>
-              <a:buNone/>
-            </a:pPr>
-            <a:r>
-              <a:rPr lang="pt-BR" sz="1600" b="0" i="0" u="none" strike="noStrike" cap="none" dirty="0">
-                <a:solidFill>
-                  <a:schemeClr val="dk1"/>
-                </a:solidFill>
-                <a:latin typeface="Times New Roman"/>
-                <a:ea typeface="Times New Roman"/>
-                <a:cs typeface="Times New Roman"/>
-                <a:sym typeface="Times New Roman"/>
-                <a:hlinkClick r:id="rId3"/>
-              </a:rPr>
-              <a:t>https://www.infoescola.com/matematica/classificacao-de-proposicoes-logicas/</a:t>
-            </a:r>
-            <a:endParaRPr lang="pt-BR" sz="1600" b="0" i="0" u="none" strike="noStrike" cap="none" dirty="0">
-              <a:solidFill>
-                <a:schemeClr val="dk1"/>
-              </a:solidFill>
-              <a:latin typeface="Times New Roman"/>
-              <a:ea typeface="Times New Roman"/>
-              <a:cs typeface="Times New Roman"/>
-              <a:sym typeface="Times New Roman"/>
-            </a:endParaRPr>
-          </a:p>
-          <a:p>
-            <a:pPr marL="0" marR="0" lvl="0" indent="0" algn="l" rtl="0">
-              <a:spcBef>
-                <a:spcPts val="0"/>
-              </a:spcBef>
-              <a:spcAft>
-                <a:spcPts val="0"/>
-              </a:spcAft>
-              <a:buClr>
-                <a:srgbClr val="000000"/>
-              </a:buClr>
-              <a:buSzPts val="1800"/>
-              <a:buFont typeface="Times New Roman"/>
-              <a:buNone/>
-            </a:pPr>
-            <a:endParaRPr lang="pt-BR" sz="1600" dirty="0">
-              <a:solidFill>
-                <a:schemeClr val="dk1"/>
-              </a:solidFill>
-              <a:latin typeface="Times New Roman"/>
-              <a:cs typeface="Times New Roman"/>
-              <a:sym typeface="Times New Roman"/>
-            </a:endParaRPr>
-          </a:p>
-          <a:p>
-            <a:pPr marL="0" marR="0" lvl="0" indent="0" algn="l" rtl="0">
-              <a:spcBef>
-                <a:spcPts val="0"/>
-              </a:spcBef>
-              <a:spcAft>
-                <a:spcPts val="0"/>
-              </a:spcAft>
-              <a:buClr>
-                <a:srgbClr val="000000"/>
-              </a:buClr>
-              <a:buSzPts val="1800"/>
-              <a:buFont typeface="Times New Roman"/>
-              <a:buNone/>
-            </a:pPr>
-            <a:r>
-              <a:rPr lang="pt-BR" sz="1600" dirty="0">
-                <a:hlinkClick r:id="rId4"/>
-              </a:rPr>
-              <a:t>https://educative.com.br/wp-content/uploads/2019/08/Exerc%C3%ADcios-neg-e-equiv.pdf</a:t>
-            </a:r>
-            <a:endParaRPr lang="pt-BR" sz="1600" dirty="0"/>
-          </a:p>
-          <a:p>
-            <a:pPr marL="0" marR="0" lvl="0" indent="0" algn="l" rtl="0">
-              <a:spcBef>
-                <a:spcPts val="0"/>
-              </a:spcBef>
-              <a:spcAft>
-                <a:spcPts val="0"/>
-              </a:spcAft>
-              <a:buClr>
-                <a:srgbClr val="000000"/>
-              </a:buClr>
-              <a:buSzPts val="1800"/>
-              <a:buFont typeface="Times New Roman"/>
-              <a:buNone/>
-            </a:pPr>
-            <a:endParaRPr lang="pt-BR" sz="1600" dirty="0"/>
-          </a:p>
-          <a:p>
-            <a:pPr marL="0" marR="0" lvl="0" indent="0" algn="l" rtl="0">
-              <a:spcBef>
-                <a:spcPts val="0"/>
-              </a:spcBef>
-              <a:spcAft>
-                <a:spcPts val="0"/>
-              </a:spcAft>
-              <a:buClr>
-                <a:srgbClr val="000000"/>
-              </a:buClr>
-              <a:buSzPts val="1800"/>
-              <a:buFont typeface="Times New Roman"/>
-              <a:buNone/>
-            </a:pPr>
-            <a:r>
-              <a:rPr lang="pt-BR" sz="1600" dirty="0">
-                <a:hlinkClick r:id="rId5"/>
-              </a:rPr>
-              <a:t>https://voceconcursado.com.br/blog/equivalencia-logica-aula-pratica-completa/</a:t>
-            </a:r>
-            <a:endParaRPr lang="pt-BR" sz="1600" dirty="0"/>
-          </a:p>
-          <a:p>
-            <a:pPr marL="0" marR="0" lvl="0" indent="0" algn="l" rtl="0">
-              <a:spcBef>
-                <a:spcPts val="0"/>
-              </a:spcBef>
-              <a:spcAft>
-                <a:spcPts val="0"/>
-              </a:spcAft>
-              <a:buClr>
-                <a:srgbClr val="000000"/>
-              </a:buClr>
-              <a:buSzPts val="1800"/>
-              <a:buFont typeface="Times New Roman"/>
-              <a:buNone/>
-            </a:pPr>
-            <a:endParaRPr lang="pt-BR" sz="1600" dirty="0"/>
-          </a:p>
-          <a:p>
-            <a:pPr marL="0" marR="0" lvl="0" indent="0" algn="l" rtl="0">
-              <a:spcBef>
-                <a:spcPts val="0"/>
-              </a:spcBef>
-              <a:spcAft>
-                <a:spcPts val="0"/>
-              </a:spcAft>
-              <a:buClr>
-                <a:srgbClr val="000000"/>
-              </a:buClr>
-              <a:buSzPts val="1800"/>
-              <a:buFont typeface="Times New Roman"/>
-              <a:buNone/>
-            </a:pPr>
-            <a:r>
-              <a:rPr lang="pt-BR" sz="1600" dirty="0"/>
-              <a:t>https://www.atfcursosjuridicos.com.br/repositorio/material/15053377219336-11fichadeaulaequivalenciasenegacoes.pdf</a:t>
-            </a:r>
-          </a:p>
-        </p:txBody>
-      </p:sp>
-    </p:spTree>
-    <p:extLst>
-      <p:ext uri="{BB962C8B-B14F-4D97-AF65-F5344CB8AC3E}">
-        <p14:creationId xmlns:p14="http://schemas.microsoft.com/office/powerpoint/2010/main" val="3758625863"/>
-      </p:ext>
-    </p:extLst>
   </p:cSld>
   <p:clrMapOvr>
     <a:masterClrMapping/>
@@ -13502,6 +13398,357 @@
 </file>
 
 <file path=ppt/slides/slide30.xml><?xml version="1.0" encoding="utf-8"?>
+<p:sld xmlns:a="http://schemas.openxmlformats.org/drawingml/2006/main" xmlns:r="http://schemas.openxmlformats.org/officeDocument/2006/relationships" xmlns:p="http://schemas.openxmlformats.org/presentationml/2006/main">
+  <p:cSld>
+    <p:spTree>
+      <p:nvGrpSpPr>
+        <p:cNvPr id="1" name="Shape 200"/>
+        <p:cNvGrpSpPr/>
+        <p:nvPr/>
+      </p:nvGrpSpPr>
+      <p:grpSpPr>
+        <a:xfrm>
+          <a:off x="0" y="0"/>
+          <a:ext cx="0" cy="0"/>
+          <a:chOff x="0" y="0"/>
+          <a:chExt cx="0" cy="0"/>
+        </a:xfrm>
+      </p:grpSpPr>
+      <p:sp>
+        <p:nvSpPr>
+          <p:cNvPr id="6" name="Google Shape;85;p5">
+            <a:extLst>
+              <a:ext uri="{FF2B5EF4-FFF2-40B4-BE49-F238E27FC236}">
+                <a16:creationId xmlns:a16="http://schemas.microsoft.com/office/drawing/2014/main" id="{5804EB6E-36FD-2DBF-5A57-FFB57FEF4D3F}"/>
+              </a:ext>
+            </a:extLst>
+          </p:cNvPr>
+          <p:cNvSpPr txBox="1"/>
+          <p:nvPr/>
+        </p:nvSpPr>
+        <p:spPr>
+          <a:xfrm>
+            <a:off x="1396272" y="486231"/>
+            <a:ext cx="7942263" cy="461665"/>
+          </a:xfrm>
+          <a:prstGeom prst="rect">
+            <a:avLst/>
+          </a:prstGeom>
+          <a:noFill/>
+          <a:ln>
+            <a:noFill/>
+          </a:ln>
+        </p:spPr>
+        <p:txBody>
+          <a:bodyPr spcFirstLastPara="1" wrap="square" lIns="91425" tIns="45700" rIns="91425" bIns="45700" anchor="t" anchorCtr="0">
+            <a:spAutoFit/>
+          </a:bodyPr>
+          <a:lstStyle/>
+          <a:p>
+            <a:pPr marL="0" marR="0" lvl="0" indent="0" algn="l" rtl="0">
+              <a:spcBef>
+                <a:spcPts val="0"/>
+              </a:spcBef>
+              <a:spcAft>
+                <a:spcPts val="0"/>
+              </a:spcAft>
+              <a:buClr>
+                <a:srgbClr val="000000"/>
+              </a:buClr>
+              <a:buSzPts val="2400"/>
+              <a:buFont typeface="Times New Roman"/>
+              <a:buNone/>
+            </a:pPr>
+            <a:r>
+              <a:rPr lang="pt-BR" sz="2400" b="1" i="0" u="none" strike="noStrike" cap="none" dirty="0">
+                <a:solidFill>
+                  <a:schemeClr val="dk1"/>
+                </a:solidFill>
+                <a:latin typeface="Times New Roman"/>
+                <a:ea typeface="Times New Roman"/>
+                <a:cs typeface="Times New Roman"/>
+                <a:sym typeface="Times New Roman"/>
+              </a:rPr>
+              <a:t>Referências</a:t>
+            </a:r>
+            <a:endParaRPr lang="pt-BR" sz="2400" b="0" i="0" u="none" strike="noStrike" cap="none" dirty="0">
+              <a:solidFill>
+                <a:schemeClr val="dk1"/>
+              </a:solidFill>
+              <a:latin typeface="Times New Roman"/>
+              <a:ea typeface="Times New Roman"/>
+              <a:cs typeface="Times New Roman"/>
+              <a:sym typeface="Times New Roman"/>
+            </a:endParaRPr>
+          </a:p>
+        </p:txBody>
+      </p:sp>
+      <p:sp>
+        <p:nvSpPr>
+          <p:cNvPr id="7" name="Google Shape;86;p5">
+            <a:extLst>
+              <a:ext uri="{FF2B5EF4-FFF2-40B4-BE49-F238E27FC236}">
+                <a16:creationId xmlns:a16="http://schemas.microsoft.com/office/drawing/2014/main" id="{F71C8896-B182-51DF-7B81-F69944D4984F}"/>
+              </a:ext>
+            </a:extLst>
+          </p:cNvPr>
+          <p:cNvSpPr txBox="1"/>
+          <p:nvPr/>
+        </p:nvSpPr>
+        <p:spPr>
+          <a:xfrm>
+            <a:off x="1396272" y="1680881"/>
+            <a:ext cx="7100306" cy="3046948"/>
+          </a:xfrm>
+          <a:prstGeom prst="rect">
+            <a:avLst/>
+          </a:prstGeom>
+          <a:noFill/>
+          <a:ln>
+            <a:noFill/>
+          </a:ln>
+        </p:spPr>
+        <p:txBody>
+          <a:bodyPr spcFirstLastPara="1" wrap="square" lIns="91425" tIns="45700" rIns="91425" bIns="45700" anchor="t" anchorCtr="0">
+            <a:spAutoFit/>
+          </a:bodyPr>
+          <a:lstStyle/>
+          <a:p>
+            <a:pPr marL="0" marR="0" lvl="0" indent="0" algn="l" rtl="0">
+              <a:spcBef>
+                <a:spcPts val="0"/>
+              </a:spcBef>
+              <a:spcAft>
+                <a:spcPts val="0"/>
+              </a:spcAft>
+              <a:buClr>
+                <a:srgbClr val="000000"/>
+              </a:buClr>
+              <a:buSzPts val="1800"/>
+              <a:buFont typeface="Times New Roman"/>
+              <a:buNone/>
+            </a:pPr>
+            <a:r>
+              <a:rPr lang="pt-BR" sz="1600" b="0" i="0" u="none" strike="noStrike" cap="none" dirty="0">
+                <a:solidFill>
+                  <a:schemeClr val="dk1"/>
+                </a:solidFill>
+                <a:latin typeface="Times New Roman"/>
+                <a:ea typeface="Times New Roman"/>
+                <a:cs typeface="Times New Roman"/>
+                <a:sym typeface="Times New Roman"/>
+              </a:rPr>
+              <a:t>https://www.infoescola.com/matematica/logica-proposicional/</a:t>
+            </a:r>
+            <a:endParaRPr lang="pt-BR" sz="1600" dirty="0"/>
+          </a:p>
+          <a:p>
+            <a:pPr marL="0" marR="0" lvl="0" indent="0" algn="l" rtl="0">
+              <a:spcBef>
+                <a:spcPts val="0"/>
+              </a:spcBef>
+              <a:spcAft>
+                <a:spcPts val="0"/>
+              </a:spcAft>
+              <a:buClr>
+                <a:srgbClr val="000000"/>
+              </a:buClr>
+              <a:buSzPts val="1800"/>
+              <a:buFont typeface="Times New Roman"/>
+              <a:buNone/>
+            </a:pPr>
+            <a:r>
+              <a:rPr lang="pt-BR" sz="1600" b="0" i="0" u="none" strike="noStrike" cap="none" dirty="0">
+                <a:solidFill>
+                  <a:schemeClr val="dk1"/>
+                </a:solidFill>
+                <a:latin typeface="Times New Roman"/>
+                <a:ea typeface="Times New Roman"/>
+                <a:cs typeface="Times New Roman"/>
+                <a:sym typeface="Times New Roman"/>
+              </a:rPr>
+              <a:t>https://www.infoescola.com/matematica/conectivos-logicos/</a:t>
+            </a:r>
+            <a:endParaRPr lang="pt-BR" sz="1600" dirty="0"/>
+          </a:p>
+          <a:p>
+            <a:pPr marL="0" marR="0" lvl="0" indent="0" algn="l" rtl="0">
+              <a:spcBef>
+                <a:spcPts val="0"/>
+              </a:spcBef>
+              <a:spcAft>
+                <a:spcPts val="0"/>
+              </a:spcAft>
+              <a:buClr>
+                <a:srgbClr val="000000"/>
+              </a:buClr>
+              <a:buSzPts val="1800"/>
+              <a:buFont typeface="Times New Roman"/>
+              <a:buNone/>
+            </a:pPr>
+            <a:r>
+              <a:rPr lang="pt-BR" sz="1600" b="0" i="0" u="none" strike="noStrike" cap="none" dirty="0">
+                <a:solidFill>
+                  <a:schemeClr val="dk1"/>
+                </a:solidFill>
+                <a:latin typeface="Times New Roman"/>
+                <a:ea typeface="Times New Roman"/>
+                <a:cs typeface="Times New Roman"/>
+                <a:sym typeface="Times New Roman"/>
+                <a:hlinkClick r:id="rId3"/>
+              </a:rPr>
+              <a:t>https://www.infoescola.com/matematica/classificacao-de-proposicoes-logicas/</a:t>
+            </a:r>
+            <a:endParaRPr lang="pt-BR" sz="1600" b="0" i="0" u="none" strike="noStrike" cap="none" dirty="0">
+              <a:solidFill>
+                <a:schemeClr val="dk1"/>
+              </a:solidFill>
+              <a:latin typeface="Times New Roman"/>
+              <a:ea typeface="Times New Roman"/>
+              <a:cs typeface="Times New Roman"/>
+              <a:sym typeface="Times New Roman"/>
+            </a:endParaRPr>
+          </a:p>
+          <a:p>
+            <a:pPr marL="0" marR="0" lvl="0" indent="0" algn="l" rtl="0">
+              <a:spcBef>
+                <a:spcPts val="0"/>
+              </a:spcBef>
+              <a:spcAft>
+                <a:spcPts val="0"/>
+              </a:spcAft>
+              <a:buClr>
+                <a:srgbClr val="000000"/>
+              </a:buClr>
+              <a:buSzPts val="1800"/>
+              <a:buFont typeface="Times New Roman"/>
+              <a:buNone/>
+            </a:pPr>
+            <a:endParaRPr lang="pt-BR" sz="1600" dirty="0">
+              <a:solidFill>
+                <a:schemeClr val="dk1"/>
+              </a:solidFill>
+              <a:latin typeface="Times New Roman"/>
+              <a:cs typeface="Times New Roman"/>
+              <a:sym typeface="Times New Roman"/>
+            </a:endParaRPr>
+          </a:p>
+          <a:p>
+            <a:pPr marL="0" marR="0" lvl="0" indent="0" algn="l" rtl="0">
+              <a:spcBef>
+                <a:spcPts val="0"/>
+              </a:spcBef>
+              <a:spcAft>
+                <a:spcPts val="0"/>
+              </a:spcAft>
+              <a:buClr>
+                <a:srgbClr val="000000"/>
+              </a:buClr>
+              <a:buSzPts val="1800"/>
+              <a:buFont typeface="Times New Roman"/>
+              <a:buNone/>
+            </a:pPr>
+            <a:r>
+              <a:rPr lang="pt-BR" sz="1600" dirty="0">
+                <a:hlinkClick r:id="rId4"/>
+              </a:rPr>
+              <a:t>https://educative.com.br/wp-content/uploads/2019/08/Exerc%C3%ADcios-neg-e-equiv.pdf</a:t>
+            </a:r>
+            <a:endParaRPr lang="pt-BR" sz="1600" dirty="0"/>
+          </a:p>
+          <a:p>
+            <a:pPr marL="0" marR="0" lvl="0" indent="0" algn="l" rtl="0">
+              <a:spcBef>
+                <a:spcPts val="0"/>
+              </a:spcBef>
+              <a:spcAft>
+                <a:spcPts val="0"/>
+              </a:spcAft>
+              <a:buClr>
+                <a:srgbClr val="000000"/>
+              </a:buClr>
+              <a:buSzPts val="1800"/>
+              <a:buFont typeface="Times New Roman"/>
+              <a:buNone/>
+            </a:pPr>
+            <a:endParaRPr lang="pt-BR" sz="1600" dirty="0"/>
+          </a:p>
+          <a:p>
+            <a:pPr marL="0" marR="0" lvl="0" indent="0" algn="l" rtl="0">
+              <a:spcBef>
+                <a:spcPts val="0"/>
+              </a:spcBef>
+              <a:spcAft>
+                <a:spcPts val="0"/>
+              </a:spcAft>
+              <a:buClr>
+                <a:srgbClr val="000000"/>
+              </a:buClr>
+              <a:buSzPts val="1800"/>
+              <a:buFont typeface="Times New Roman"/>
+              <a:buNone/>
+            </a:pPr>
+            <a:r>
+              <a:rPr lang="pt-BR" sz="1600" dirty="0">
+                <a:hlinkClick r:id="rId5"/>
+              </a:rPr>
+              <a:t>https://voceconcursado.com.br/blog/equivalencia-logica-aula-pratica-completa/</a:t>
+            </a:r>
+            <a:endParaRPr lang="pt-BR" sz="1600" dirty="0"/>
+          </a:p>
+          <a:p>
+            <a:pPr marL="0" marR="0" lvl="0" indent="0" algn="l" rtl="0">
+              <a:spcBef>
+                <a:spcPts val="0"/>
+              </a:spcBef>
+              <a:spcAft>
+                <a:spcPts val="0"/>
+              </a:spcAft>
+              <a:buClr>
+                <a:srgbClr val="000000"/>
+              </a:buClr>
+              <a:buSzPts val="1800"/>
+              <a:buFont typeface="Times New Roman"/>
+              <a:buNone/>
+            </a:pPr>
+            <a:endParaRPr lang="pt-BR" sz="1600" dirty="0"/>
+          </a:p>
+          <a:p>
+            <a:pPr marL="0" marR="0" lvl="0" indent="0" algn="l" rtl="0">
+              <a:spcBef>
+                <a:spcPts val="0"/>
+              </a:spcBef>
+              <a:spcAft>
+                <a:spcPts val="0"/>
+              </a:spcAft>
+              <a:buClr>
+                <a:srgbClr val="000000"/>
+              </a:buClr>
+              <a:buSzPts val="1800"/>
+              <a:buFont typeface="Times New Roman"/>
+              <a:buNone/>
+            </a:pPr>
+            <a:r>
+              <a:rPr lang="pt-BR" sz="1600" dirty="0"/>
+              <a:t>https://www.atfcursosjuridicos.com.br/repositorio/material/15053377219336-11fichadeaulaequivalenciasenegacoes.pdf</a:t>
+            </a:r>
+          </a:p>
+        </p:txBody>
+      </p:sp>
+    </p:spTree>
+    <p:extLst>
+      <p:ext uri="{BB962C8B-B14F-4D97-AF65-F5344CB8AC3E}">
+        <p14:creationId xmlns:p14="http://schemas.microsoft.com/office/powerpoint/2010/main" val="3758625863"/>
+      </p:ext>
+    </p:extLst>
+  </p:cSld>
+  <p:clrMapOvr>
+    <a:masterClrMapping/>
+  </p:clrMapOvr>
+</p:sld>
+</file>
+
+<file path=ppt/slides/slide31.xml><?xml version="1.0" encoding="utf-8"?>
 <p:sld xmlns:a="http://schemas.openxmlformats.org/drawingml/2006/main" xmlns:r="http://schemas.openxmlformats.org/officeDocument/2006/relationships" xmlns:p="http://schemas.openxmlformats.org/presentationml/2006/main">
   <p:cSld>
     <p:spTree>

</xml_diff>